<commit_message>
Fixes on slides for GROUP BY
</commit_message>
<xml_diff>
--- a/Courses/Software-Sciences/Module-3-Databases-New/12-Group-and-Aggregate-Functions/10-Group-and-Aggregate-Functions.pptx
+++ b/Courses/Software-Sciences/Module-3-Databases-New/12-Group-and-Aggregate-Functions/10-Group-and-Aggregate-Functions.pptx
@@ -465,7 +465,7 @@
           <a:p>
             <a:fld id="{4E087215-0C8F-4762-A664-737A353EC9A4}" type="datetimeFigureOut">
               <a:rPr lang="bg-BG" smtClean="0"/>
-              <a:t>6.10.2023 г.</a:t>
+              <a:t>13.12.2023 г.</a:t>
             </a:fld>
             <a:endParaRPr lang="bg-BG"/>
           </a:p>
@@ -661,7 +661,7 @@
           <a:p>
             <a:fld id="{72D84649-876A-46C9-8472-14CB09C070D8}" type="datetimeFigureOut">
               <a:rPr lang="en-US" smtClean="0"/>
-              <a:t>10/6/2023</a:t>
+              <a:t>12/13/2023</a:t>
             </a:fld>
             <a:endParaRPr lang="en-US"/>
           </a:p>
@@ -12090,7 +12090,7 @@
         </p:nvSpPr>
         <p:spPr>
           <a:xfrm>
-            <a:off x="615109" y="5990916"/>
+            <a:off x="615109" y="5585916"/>
             <a:ext cx="10961783" cy="768084"/>
           </a:xfrm>
         </p:spPr>
@@ -12132,7 +12132,7 @@
         </p:nvSpPr>
         <p:spPr>
           <a:xfrm>
-            <a:off x="615109" y="4820916"/>
+            <a:off x="615109" y="4704825"/>
             <a:ext cx="10961783" cy="768084"/>
           </a:xfrm>
         </p:spPr>

</xml_diff>

<commit_message>
Fixes on GROUP BY slides
</commit_message>
<xml_diff>
--- a/Courses/Software-Sciences/Module-3-Databases-New/12-Group-and-Aggregate-Functions/10-Group-and-Aggregate-Functions.pptx
+++ b/Courses/Software-Sciences/Module-3-Databases-New/12-Group-and-Aggregate-Functions/10-Group-and-Aggregate-Functions.pptx
@@ -465,7 +465,7 @@
           <a:p>
             <a:fld id="{4E087215-0C8F-4762-A664-737A353EC9A4}" type="datetimeFigureOut">
               <a:rPr lang="bg-BG" smtClean="0"/>
-              <a:t>13.12.2023 г.</a:t>
+              <a:t>18.12.2023 г.</a:t>
             </a:fld>
             <a:endParaRPr lang="bg-BG"/>
           </a:p>
@@ -661,7 +661,7 @@
           <a:p>
             <a:fld id="{72D84649-876A-46C9-8472-14CB09C070D8}" type="datetimeFigureOut">
               <a:rPr lang="en-US" smtClean="0"/>
-              <a:t>12/13/2023</a:t>
+              <a:t>12/18/2023</a:t>
             </a:fld>
             <a:endParaRPr lang="en-US"/>
           </a:p>
@@ -28104,10 +28104,28 @@
                   </a:schemeClr>
                 </a:solidFill>
               </a:rPr>
-              <a:t>Не могат да се комбинират колони с </a:t>
-            </a:r>
-            <a:r>
-              <a:rPr lang="ru-RU" b="1" dirty="0" err="1">
+              <a:t>Не могат да се </a:t>
+            </a:r>
+            <a:r>
+              <a:rPr lang="ru-RU" b="1" dirty="0">
+                <a:solidFill>
+                  <a:schemeClr val="bg1"/>
+                </a:solidFill>
+              </a:rPr>
+              <a:t>комбинират</a:t>
+            </a:r>
+            <a:r>
+              <a:rPr lang="ru-RU" dirty="0">
+                <a:solidFill>
+                  <a:schemeClr val="tx2">
+                    <a:lumMod val="75000"/>
+                  </a:schemeClr>
+                </a:solidFill>
+              </a:rPr>
+              <a:t> колони с </a:t>
+            </a:r>
+            <a:r>
+              <a:rPr lang="ru-RU" b="1" dirty="0">
                 <a:solidFill>
                   <a:schemeClr val="bg1"/>
                 </a:solidFill>
@@ -28140,7 +28158,17 @@
                   </a:schemeClr>
                 </a:solidFill>
               </a:rPr>
-              <a:t>, освен ако колоните не са в клаузата </a:t>
+              <a:t>, освен ако колоните не са в</a:t>
+            </a:r>
+            <a:r>
+              <a:rPr lang="en-US" dirty="0">
+                <a:solidFill>
+                  <a:schemeClr val="tx2">
+                    <a:lumMod val="75000"/>
+                  </a:schemeClr>
+                </a:solidFill>
+              </a:rPr>
+              <a:t> </a:t>
             </a:r>
             <a:r>
               <a:rPr lang="ru-RU" b="1" dirty="0">
@@ -28169,6 +28197,16 @@
                 <a:latin typeface="Consolas" pitchFamily="49" charset="0"/>
               </a:rPr>
               <a:t>BY</a:t>
+            </a:r>
+            <a:r>
+              <a:rPr lang="ru-RU" dirty="0">
+                <a:solidFill>
+                  <a:schemeClr val="tx2">
+                    <a:lumMod val="75000"/>
+                  </a:schemeClr>
+                </a:solidFill>
+              </a:rPr>
+              <a:t> клаузата</a:t>
             </a:r>
             <a:endParaRPr lang="en-US" b="1" dirty="0">
               <a:solidFill>
@@ -28199,7 +28237,15 @@
             </a:r>
             <a:r>
               <a:rPr lang="bg-BG" dirty="0"/>
-              <a:t>също е неправилен</a:t>
+              <a:t>също е </a:t>
+            </a:r>
+            <a:r>
+              <a:rPr lang="bg-BG" b="1" dirty="0">
+                <a:solidFill>
+                  <a:schemeClr val="bg1"/>
+                </a:solidFill>
+              </a:rPr>
+              <a:t>неправилен</a:t>
             </a:r>
             <a:r>
               <a:rPr lang="en-US" dirty="0"/>
@@ -28238,7 +28284,7 @@
               <a:t> за </a:t>
             </a:r>
             <a:r>
-              <a:rPr lang="ru-RU" dirty="0" err="1"/>
+              <a:rPr lang="bg-BG" dirty="0"/>
               <a:t>групови</a:t>
             </a:r>
             <a:r>
@@ -28820,6 +28866,33 @@
                                   </p:childTnLst>
                                 </p:cTn>
                               </p:par>
+                              <p:par>
+                                <p:cTn id="13" presetID="1" presetClass="entr" presetSubtype="0" fill="hold" nodeType="withEffect">
+                                  <p:stCondLst>
+                                    <p:cond delay="0"/>
+                                  </p:stCondLst>
+                                  <p:childTnLst>
+                                    <p:set>
+                                      <p:cBhvr>
+                                        <p:cTn id="14" dur="1" fill="hold">
+                                          <p:stCondLst>
+                                            <p:cond delay="0"/>
+                                          </p:stCondLst>
+                                        </p:cTn>
+                                        <p:tgtEl>
+                                          <p:spTgt spid="11"/>
+                                        </p:tgtEl>
+                                        <p:attrNameLst>
+                                          <p:attrName>style.visibility</p:attrName>
+                                        </p:attrNameLst>
+                                      </p:cBhvr>
+                                      <p:to>
+                                        <p:strVal val="visible"/>
+                                      </p:to>
+                                    </p:set>
+                                  </p:childTnLst>
+                                </p:cTn>
+                              </p:par>
                             </p:childTnLst>
                           </p:cTn>
                         </p:par>
@@ -28827,26 +28900,26 @@
                     </p:cTn>
                   </p:par>
                   <p:par>
-                    <p:cTn id="13" fill="hold">
+                    <p:cTn id="15" fill="hold">
                       <p:stCondLst>
                         <p:cond delay="indefinite"/>
                       </p:stCondLst>
                       <p:childTnLst>
                         <p:par>
-                          <p:cTn id="14" fill="hold">
+                          <p:cTn id="16" fill="hold">
                             <p:stCondLst>
                               <p:cond delay="0"/>
                             </p:stCondLst>
                             <p:childTnLst>
                               <p:par>
-                                <p:cTn id="15" presetID="1" presetClass="entr" presetSubtype="0" fill="hold" nodeType="clickEffect">
+                                <p:cTn id="17" presetID="1" presetClass="entr" presetSubtype="0" fill="hold" nodeType="clickEffect">
                                   <p:stCondLst>
                                     <p:cond delay="0"/>
                                   </p:stCondLst>
                                   <p:childTnLst>
                                     <p:set>
                                       <p:cBhvr>
-                                        <p:cTn id="16" dur="1" fill="hold">
+                                        <p:cTn id="18" dur="1" fill="hold">
                                           <p:stCondLst>
                                             <p:cond delay="0"/>
                                           </p:stCondLst>
@@ -29613,13 +29686,14 @@
               <a:lnSpc>
                 <a:spcPct val="100000"/>
               </a:lnSpc>
+              <a:buClr>
+                <a:schemeClr val="tx1"/>
+              </a:buClr>
             </a:pPr>
             <a:r>
               <a:rPr lang="ru-RU" b="1" dirty="0">
                 <a:solidFill>
-                  <a:schemeClr val="tx2">
-                    <a:lumMod val="75000"/>
-                  </a:schemeClr>
+                  <a:schemeClr val="bg1"/>
                 </a:solidFill>
                 <a:latin typeface="Consolas" pitchFamily="49" charset="0"/>
               </a:rPr>
@@ -29638,9 +29712,7 @@
             <a:r>
               <a:rPr lang="ru-RU" b="1" dirty="0">
                 <a:solidFill>
-                  <a:schemeClr val="tx2">
-                    <a:lumMod val="75000"/>
-                  </a:schemeClr>
+                  <a:schemeClr val="bg1"/>
                 </a:solidFill>
                 <a:latin typeface="Consolas" pitchFamily="49" charset="0"/>
               </a:rPr>
@@ -29654,9 +29726,39 @@
                   </a:schemeClr>
                 </a:solidFill>
               </a:rPr>
-              <a:t>, но се използва за групиращи функции</a:t>
-            </a:r>
-            <a:endParaRPr lang="en-US" dirty="0"/>
+              <a:t>, но се използва за </a:t>
+            </a:r>
+            <a:r>
+              <a:rPr lang="ru-RU" b="1" dirty="0">
+                <a:solidFill>
+                  <a:schemeClr val="tx2">
+                    <a:lumMod val="75000"/>
+                  </a:schemeClr>
+                </a:solidFill>
+              </a:rPr>
+              <a:t>групиращи</a:t>
+            </a:r>
+            <a:r>
+              <a:rPr lang="ru-RU" dirty="0">
+                <a:solidFill>
+                  <a:schemeClr val="tx2">
+                    <a:lumMod val="75000"/>
+                  </a:schemeClr>
+                </a:solidFill>
+              </a:rPr>
+              <a:t> </a:t>
+            </a:r>
+            <a:r>
+              <a:rPr lang="ru-RU" b="1" dirty="0">
+                <a:solidFill>
+                  <a:schemeClr val="tx2">
+                    <a:lumMod val="75000"/>
+                  </a:schemeClr>
+                </a:solidFill>
+              </a:rPr>
+              <a:t>функции</a:t>
+            </a:r>
+            <a:endParaRPr lang="en-US" b="1" dirty="0"/>
           </a:p>
         </p:txBody>
       </p:sp>

</xml_diff>